<commit_message>
added text and ideas
</commit_message>
<xml_diff>
--- a/data/survey_flowchart.pptx
+++ b/data/survey_flowchart.pptx
@@ -104,6 +104,11 @@
       </a:defRPr>
     </a:lvl9pPr>
   </p:defaultTextStyle>
+  <p:extLst>
+    <p:ext uri="{EFAFB233-063F-42B5-8137-9DF3F51BA10A}">
+      <p15:sldGuideLst xmlns:p15="http://schemas.microsoft.com/office/powerpoint/2012/main"/>
+    </p:ext>
+  </p:extLst>
 </p:presentation>
 </file>
 
@@ -254,7 +259,7 @@
           <a:p>
             <a:fld id="{146E1349-3251-CE4D-B280-702F12885321}" type="datetimeFigureOut">
               <a:rPr lang="de-DE" smtClean="0"/>
-              <a:t>27.02.24</a:t>
+              <a:t>29.02.24</a:t>
             </a:fld>
             <a:endParaRPr lang="de-DE"/>
           </a:p>
@@ -452,7 +457,7 @@
           <a:p>
             <a:fld id="{146E1349-3251-CE4D-B280-702F12885321}" type="datetimeFigureOut">
               <a:rPr lang="de-DE" smtClean="0"/>
-              <a:t>27.02.24</a:t>
+              <a:t>29.02.24</a:t>
             </a:fld>
             <a:endParaRPr lang="de-DE"/>
           </a:p>
@@ -660,7 +665,7 @@
           <a:p>
             <a:fld id="{146E1349-3251-CE4D-B280-702F12885321}" type="datetimeFigureOut">
               <a:rPr lang="de-DE" smtClean="0"/>
-              <a:t>27.02.24</a:t>
+              <a:t>29.02.24</a:t>
             </a:fld>
             <a:endParaRPr lang="de-DE"/>
           </a:p>
@@ -858,7 +863,7 @@
           <a:p>
             <a:fld id="{146E1349-3251-CE4D-B280-702F12885321}" type="datetimeFigureOut">
               <a:rPr lang="de-DE" smtClean="0"/>
-              <a:t>27.02.24</a:t>
+              <a:t>29.02.24</a:t>
             </a:fld>
             <a:endParaRPr lang="de-DE"/>
           </a:p>
@@ -1133,7 +1138,7 @@
           <a:p>
             <a:fld id="{146E1349-3251-CE4D-B280-702F12885321}" type="datetimeFigureOut">
               <a:rPr lang="de-DE" smtClean="0"/>
-              <a:t>27.02.24</a:t>
+              <a:t>29.02.24</a:t>
             </a:fld>
             <a:endParaRPr lang="de-DE"/>
           </a:p>
@@ -1398,7 +1403,7 @@
           <a:p>
             <a:fld id="{146E1349-3251-CE4D-B280-702F12885321}" type="datetimeFigureOut">
               <a:rPr lang="de-DE" smtClean="0"/>
-              <a:t>27.02.24</a:t>
+              <a:t>29.02.24</a:t>
             </a:fld>
             <a:endParaRPr lang="de-DE"/>
           </a:p>
@@ -1810,7 +1815,7 @@
           <a:p>
             <a:fld id="{146E1349-3251-CE4D-B280-702F12885321}" type="datetimeFigureOut">
               <a:rPr lang="de-DE" smtClean="0"/>
-              <a:t>27.02.24</a:t>
+              <a:t>29.02.24</a:t>
             </a:fld>
             <a:endParaRPr lang="de-DE"/>
           </a:p>
@@ -1951,7 +1956,7 @@
           <a:p>
             <a:fld id="{146E1349-3251-CE4D-B280-702F12885321}" type="datetimeFigureOut">
               <a:rPr lang="de-DE" smtClean="0"/>
-              <a:t>27.02.24</a:t>
+              <a:t>29.02.24</a:t>
             </a:fld>
             <a:endParaRPr lang="de-DE"/>
           </a:p>
@@ -2064,7 +2069,7 @@
           <a:p>
             <a:fld id="{146E1349-3251-CE4D-B280-702F12885321}" type="datetimeFigureOut">
               <a:rPr lang="de-DE" smtClean="0"/>
-              <a:t>27.02.24</a:t>
+              <a:t>29.02.24</a:t>
             </a:fld>
             <a:endParaRPr lang="de-DE"/>
           </a:p>
@@ -2375,7 +2380,7 @@
           <a:p>
             <a:fld id="{146E1349-3251-CE4D-B280-702F12885321}" type="datetimeFigureOut">
               <a:rPr lang="de-DE" smtClean="0"/>
-              <a:t>27.02.24</a:t>
+              <a:t>29.02.24</a:t>
             </a:fld>
             <a:endParaRPr lang="de-DE"/>
           </a:p>
@@ -2663,7 +2668,7 @@
           <a:p>
             <a:fld id="{146E1349-3251-CE4D-B280-702F12885321}" type="datetimeFigureOut">
               <a:rPr lang="de-DE" smtClean="0"/>
-              <a:t>27.02.24</a:t>
+              <a:t>29.02.24</a:t>
             </a:fld>
             <a:endParaRPr lang="de-DE"/>
           </a:p>
@@ -2904,7 +2909,7 @@
           <a:p>
             <a:fld id="{146E1349-3251-CE4D-B280-702F12885321}" type="datetimeFigureOut">
               <a:rPr lang="de-DE" smtClean="0"/>
-              <a:t>27.02.24</a:t>
+              <a:t>29.02.24</a:t>
             </a:fld>
             <a:endParaRPr lang="de-DE"/>
           </a:p>
@@ -3335,7 +3340,7 @@
         </p:nvSpPr>
         <p:spPr>
           <a:xfrm>
-            <a:off x="2990070" y="267974"/>
+            <a:off x="4260730" y="279850"/>
             <a:ext cx="3447393" cy="767255"/>
           </a:xfrm>
           <a:prstGeom prst="roundRect">
@@ -3420,7 +3425,7 @@
         </p:nvSpPr>
         <p:spPr>
           <a:xfrm>
-            <a:off x="2990069" y="1928541"/>
+            <a:off x="4260729" y="1940417"/>
             <a:ext cx="3447393" cy="767255"/>
           </a:xfrm>
           <a:prstGeom prst="roundRect">
@@ -3489,6 +3494,38 @@
               <a:t>19 Fragen pro Bogen</a:t>
             </a:r>
           </a:p>
+          <a:p>
+            <a:pPr algn="ctr"/>
+            <a:r>
+              <a:rPr lang="de-DE" sz="1400" dirty="0">
+                <a:ln w="0"/>
+                <a:solidFill>
+                  <a:schemeClr val="tx1"/>
+                </a:solidFill>
+                <a:effectLst>
+                  <a:outerShdw blurRad="38100" dist="19050" dir="2700000" algn="tl" rotWithShape="0">
+                    <a:schemeClr val="dk1">
+                      <a:alpha val="40000"/>
+                    </a:schemeClr>
+                  </a:outerShdw>
+                </a:effectLst>
+              </a:rPr>
+              <a:t>(11.3% fehlende Werte)</a:t>
+            </a:r>
+            <a:endParaRPr lang="de-DE" dirty="0">
+              <a:ln w="0"/>
+              <a:solidFill>
+                <a:schemeClr val="tx1"/>
+              </a:solidFill>
+              <a:effectLst>
+                <a:outerShdw blurRad="38100" dist="19050" dir="2700000" algn="tl" rotWithShape="0">
+                  <a:schemeClr val="dk1">
+                    <a:alpha val="40000"/>
+                  </a:schemeClr>
+                </a:outerShdw>
+              </a:effectLst>
+            </a:endParaRPr>
+          </a:p>
         </p:txBody>
       </p:sp>
       <p:cxnSp>
@@ -3508,7 +3545,7 @@
         </p:nvCxnSpPr>
         <p:spPr>
           <a:xfrm flipH="1">
-            <a:off x="4713766" y="1035229"/>
+            <a:off x="5984426" y="1047105"/>
             <a:ext cx="1" cy="893312"/>
           </a:xfrm>
           <a:prstGeom prst="straightConnector1">
@@ -3547,7 +3584,7 @@
         </p:nvSpPr>
         <p:spPr>
           <a:xfrm>
-            <a:off x="6788194" y="1098257"/>
+            <a:off x="8058854" y="1110133"/>
             <a:ext cx="3447385" cy="733029"/>
           </a:xfrm>
           <a:prstGeom prst="roundRect">
@@ -3616,7 +3653,7 @@
         </p:nvCxnSpPr>
         <p:spPr>
           <a:xfrm flipH="1">
-            <a:off x="4713766" y="1464772"/>
+            <a:off x="5984426" y="1476648"/>
             <a:ext cx="2074428" cy="0"/>
           </a:xfrm>
           <a:prstGeom prst="line">
@@ -3652,7 +3689,7 @@
         </p:nvSpPr>
         <p:spPr>
           <a:xfrm>
-            <a:off x="2990069" y="3589108"/>
+            <a:off x="4260729" y="3600984"/>
             <a:ext cx="3447393" cy="767254"/>
           </a:xfrm>
           <a:prstGeom prst="roundRect">
@@ -3699,7 +3736,7 @@
                   </a:outerShdw>
                 </a:effectLst>
               </a:rPr>
-              <a:t>173 Fragebögen zur Auswertung</a:t>
+              <a:t>170 Fragebögen zur Auswertung</a:t>
             </a:r>
           </a:p>
           <a:p>
@@ -3724,6 +3761,22 @@
           <a:p>
             <a:pPr algn="ctr"/>
             <a:r>
+              <a:rPr lang="de-DE" sz="1400">
+                <a:ln w="0"/>
+                <a:solidFill>
+                  <a:schemeClr val="tx1"/>
+                </a:solidFill>
+                <a:effectLst>
+                  <a:outerShdw blurRad="38100" dist="19050" dir="2700000" algn="tl" rotWithShape="0">
+                    <a:schemeClr val="dk1">
+                      <a:alpha val="40000"/>
+                    </a:schemeClr>
+                  </a:outerShdw>
+                </a:effectLst>
+              </a:rPr>
+              <a:t>(10.6% </a:t>
+            </a:r>
+            <a:r>
               <a:rPr lang="de-DE" sz="1400" dirty="0">
                 <a:ln w="0"/>
                 <a:solidFill>
@@ -3737,7 +3790,7 @@
                   </a:outerShdw>
                 </a:effectLst>
               </a:rPr>
-              <a:t>(12.2% fehlende Werte)</a:t>
+              <a:t>fehlende Werte)</a:t>
             </a:r>
           </a:p>
         </p:txBody>
@@ -3756,7 +3809,7 @@
         </p:nvCxnSpPr>
         <p:spPr>
           <a:xfrm flipH="1">
-            <a:off x="4713765" y="2695795"/>
+            <a:off x="5984425" y="2707671"/>
             <a:ext cx="1" cy="893312"/>
           </a:xfrm>
           <a:prstGeom prst="straightConnector1">
@@ -3797,7 +3850,7 @@
         </p:nvCxnSpPr>
         <p:spPr>
           <a:xfrm flipH="1">
-            <a:off x="4713765" y="3142451"/>
+            <a:off x="5984424" y="2976197"/>
             <a:ext cx="2074429" cy="0"/>
           </a:xfrm>
           <a:prstGeom prst="line">
@@ -3833,7 +3886,7 @@
         </p:nvSpPr>
         <p:spPr>
           <a:xfrm>
-            <a:off x="6788194" y="2615622"/>
+            <a:off x="8058854" y="2627498"/>
             <a:ext cx="3447393" cy="1818155"/>
           </a:xfrm>
           <a:prstGeom prst="roundRect">
@@ -4041,7 +4094,7 @@
         </p:nvSpPr>
         <p:spPr>
           <a:xfrm>
-            <a:off x="6903777" y="4401880"/>
+            <a:off x="8174437" y="4413756"/>
             <a:ext cx="3317626" cy="430887"/>
           </a:xfrm>
           <a:prstGeom prst="rect">
@@ -4080,7 +4133,7 @@
         </p:nvSpPr>
         <p:spPr>
           <a:xfrm>
-            <a:off x="5064496" y="5190079"/>
+            <a:off x="6335156" y="5201955"/>
             <a:ext cx="3447393" cy="1167844"/>
           </a:xfrm>
           <a:prstGeom prst="roundRect">
@@ -4280,7 +4333,7 @@
         </p:nvCxnSpPr>
         <p:spPr>
           <a:xfrm flipH="1">
-            <a:off x="2679791" y="4853747"/>
+            <a:off x="3950451" y="4865623"/>
             <a:ext cx="4115491" cy="0"/>
           </a:xfrm>
           <a:prstGeom prst="line">
@@ -4316,7 +4369,7 @@
         </p:nvSpPr>
         <p:spPr>
           <a:xfrm>
-            <a:off x="972741" y="5182747"/>
+            <a:off x="2243401" y="5194623"/>
             <a:ext cx="3447393" cy="1175176"/>
           </a:xfrm>
           <a:prstGeom prst="roundRect">
@@ -4394,7 +4447,7 @@
                   </a:outerShdw>
                 </a:effectLst>
               </a:rPr>
-              <a:t>; N = 146] </a:t>
+              <a:t>; N = 143] </a:t>
             </a:r>
             <a:r>
               <a:rPr lang="de-DE" sz="1400" i="1" dirty="0">
@@ -4475,7 +4528,7 @@
                   </a:outerShdw>
                 </a:effectLst>
               </a:rPr>
-              <a:t>; N = 114] </a:t>
+              <a:t>; N = 111] </a:t>
             </a:r>
             <a:r>
               <a:rPr lang="de-DE" sz="1400" i="1" dirty="0">
@@ -4513,7 +4566,7 @@
         </p:nvCxnSpPr>
         <p:spPr>
           <a:xfrm>
-            <a:off x="2689349" y="4832767"/>
+            <a:off x="3960009" y="4844643"/>
             <a:ext cx="7089" cy="349980"/>
           </a:xfrm>
           <a:prstGeom prst="straightConnector1">
@@ -4554,7 +4607,7 @@
         </p:nvCxnSpPr>
         <p:spPr>
           <a:xfrm>
-            <a:off x="6788193" y="4832767"/>
+            <a:off x="8058853" y="4844643"/>
             <a:ext cx="7089" cy="349980"/>
           </a:xfrm>
           <a:prstGeom prst="straightConnector1">
@@ -4595,7 +4648,7 @@
         </p:nvCxnSpPr>
         <p:spPr>
           <a:xfrm flipV="1">
-            <a:off x="4717307" y="4356362"/>
+            <a:off x="5987967" y="4368238"/>
             <a:ext cx="0" cy="476405"/>
           </a:xfrm>
           <a:prstGeom prst="line">
@@ -4617,6 +4670,132 @@
           </a:fontRef>
         </p:style>
       </p:cxnSp>
+      <p:cxnSp>
+        <p:nvCxnSpPr>
+          <p:cNvPr id="2" name="Gerade Verbindung 1">
+            <a:extLst>
+              <a:ext uri="{FF2B5EF4-FFF2-40B4-BE49-F238E27FC236}">
+                <a16:creationId xmlns:a16="http://schemas.microsoft.com/office/drawing/2014/main" id="{E6314F0F-241E-5F94-A9C3-E5EF3870D3A7}"/>
+              </a:ext>
+            </a:extLst>
+          </p:cNvPr>
+          <p:cNvCxnSpPr>
+            <a:cxnSpLocks/>
+          </p:cNvCxnSpPr>
+          <p:nvPr/>
+        </p:nvCxnSpPr>
+        <p:spPr>
+          <a:xfrm flipH="1">
+            <a:off x="3909995" y="3306727"/>
+            <a:ext cx="2074429" cy="0"/>
+          </a:xfrm>
+          <a:prstGeom prst="line">
+            <a:avLst/>
+          </a:prstGeom>
+        </p:spPr>
+        <p:style>
+          <a:lnRef idx="3">
+            <a:schemeClr val="dk1"/>
+          </a:lnRef>
+          <a:fillRef idx="0">
+            <a:schemeClr val="dk1"/>
+          </a:fillRef>
+          <a:effectRef idx="2">
+            <a:schemeClr val="dk1"/>
+          </a:effectRef>
+          <a:fontRef idx="minor">
+            <a:schemeClr val="tx1"/>
+          </a:fontRef>
+        </p:style>
+      </p:cxnSp>
+      <p:sp>
+        <p:nvSpPr>
+          <p:cNvPr id="3" name="Abgerundetes Rechteck 2">
+            <a:extLst>
+              <a:ext uri="{FF2B5EF4-FFF2-40B4-BE49-F238E27FC236}">
+                <a16:creationId xmlns:a16="http://schemas.microsoft.com/office/drawing/2014/main" id="{B1A45498-2BEB-FCB7-E3DA-EAFEE7D2C7C0}"/>
+              </a:ext>
+            </a:extLst>
+          </p:cNvPr>
+          <p:cNvSpPr/>
+          <p:nvPr/>
+        </p:nvSpPr>
+        <p:spPr>
+          <a:xfrm>
+            <a:off x="462601" y="2890028"/>
+            <a:ext cx="3447393" cy="833398"/>
+          </a:xfrm>
+          <a:prstGeom prst="roundRect">
+            <a:avLst/>
+          </a:prstGeom>
+          <a:solidFill>
+            <a:schemeClr val="bg2">
+              <a:lumMod val="90000"/>
+            </a:schemeClr>
+          </a:solidFill>
+        </p:spPr>
+        <p:style>
+          <a:lnRef idx="2">
+            <a:schemeClr val="accent3">
+              <a:shade val="15000"/>
+            </a:schemeClr>
+          </a:lnRef>
+          <a:fillRef idx="1">
+            <a:schemeClr val="accent3"/>
+          </a:fillRef>
+          <a:effectRef idx="0">
+            <a:schemeClr val="accent3"/>
+          </a:effectRef>
+          <a:fontRef idx="minor">
+            <a:schemeClr val="lt1"/>
+          </a:fontRef>
+        </p:style>
+        <p:txBody>
+          <a:bodyPr rtlCol="0" anchor="ctr"/>
+          <a:lstStyle/>
+          <a:p>
+            <a:pPr algn="ctr"/>
+            <a:r>
+              <a:rPr lang="de-DE" b="1" u="sng" dirty="0">
+                <a:ln w="0"/>
+                <a:solidFill>
+                  <a:schemeClr val="tx1"/>
+                </a:solidFill>
+                <a:effectLst>
+                  <a:outerShdw blurRad="38100" dist="19050" dir="2700000" algn="tl" rotWithShape="0">
+                    <a:schemeClr val="dk1">
+                      <a:alpha val="40000"/>
+                    </a:schemeClr>
+                  </a:outerShdw>
+                </a:effectLst>
+              </a:rPr>
+              <a:t>Fragebögen entfernt:</a:t>
+            </a:r>
+          </a:p>
+          <a:p>
+            <a:pPr marL="285750" indent="-285750">
+              <a:buFont typeface="Arial" panose="020B0604020202020204" pitchFamily="34" charset="0"/>
+              <a:buChar char="•"/>
+            </a:pPr>
+            <a:r>
+              <a:rPr lang="de-DE" dirty="0">
+                <a:ln w="0"/>
+                <a:solidFill>
+                  <a:schemeClr val="tx1"/>
+                </a:solidFill>
+                <a:effectLst>
+                  <a:outerShdw blurRad="38100" dist="19050" dir="2700000" algn="tl" rotWithShape="0">
+                    <a:schemeClr val="dk1">
+                      <a:alpha val="40000"/>
+                    </a:schemeClr>
+                  </a:outerShdw>
+                </a:effectLst>
+              </a:rPr>
+              <a:t>Fehlende Antworten (3)</a:t>
+            </a:r>
+          </a:p>
+        </p:txBody>
+      </p:sp>
     </p:spTree>
     <p:extLst>
       <p:ext uri="{BB962C8B-B14F-4D97-AF65-F5344CB8AC3E}">

</xml_diff>